<commit_message>
Added pandas and MatplotLib PPTs
</commit_message>
<xml_diff>
--- a/PPTs/Python/Class 2.pptx
+++ b/PPTs/Python/Class 2.pptx
@@ -124,6 +124,11 @@
       </a:defRPr>
     </a:lvl9pPr>
   </p:defaultTextStyle>
+  <p:extLst>
+    <p:ext uri="{EFAFB233-063F-42B5-8137-9DF3F51BA10A}">
+      <p15:sldGuideLst xmlns:p15="http://schemas.microsoft.com/office/powerpoint/2012/main"/>
+    </p:ext>
+  </p:extLst>
 </p:presentation>
 </file>
 
@@ -276,7 +281,7 @@
           <a:p>
             <a:fld id="{53E513F0-27CE-47BF-98B5-D7A562B895BD}" type="datetimeFigureOut">
               <a:rPr lang="es-PE" smtClean="0"/>
-              <a:t>3/04/2024</a:t>
+              <a:t>7/05/2024</a:t>
             </a:fld>
             <a:endParaRPr lang="es-PE"/>
           </a:p>
@@ -476,7 +481,7 @@
           <a:p>
             <a:fld id="{53E513F0-27CE-47BF-98B5-D7A562B895BD}" type="datetimeFigureOut">
               <a:rPr lang="es-PE" smtClean="0"/>
-              <a:t>3/04/2024</a:t>
+              <a:t>7/05/2024</a:t>
             </a:fld>
             <a:endParaRPr lang="es-PE"/>
           </a:p>
@@ -686,7 +691,7 @@
           <a:p>
             <a:fld id="{53E513F0-27CE-47BF-98B5-D7A562B895BD}" type="datetimeFigureOut">
               <a:rPr lang="es-PE" smtClean="0"/>
-              <a:t>3/04/2024</a:t>
+              <a:t>7/05/2024</a:t>
             </a:fld>
             <a:endParaRPr lang="es-PE"/>
           </a:p>
@@ -886,7 +891,7 @@
           <a:p>
             <a:fld id="{53E513F0-27CE-47BF-98B5-D7A562B895BD}" type="datetimeFigureOut">
               <a:rPr lang="es-PE" smtClean="0"/>
-              <a:t>3/04/2024</a:t>
+              <a:t>7/05/2024</a:t>
             </a:fld>
             <a:endParaRPr lang="es-PE"/>
           </a:p>
@@ -1162,7 +1167,7 @@
           <a:p>
             <a:fld id="{53E513F0-27CE-47BF-98B5-D7A562B895BD}" type="datetimeFigureOut">
               <a:rPr lang="es-PE" smtClean="0"/>
-              <a:t>3/04/2024</a:t>
+              <a:t>7/05/2024</a:t>
             </a:fld>
             <a:endParaRPr lang="es-PE"/>
           </a:p>
@@ -1430,7 +1435,7 @@
           <a:p>
             <a:fld id="{53E513F0-27CE-47BF-98B5-D7A562B895BD}" type="datetimeFigureOut">
               <a:rPr lang="es-PE" smtClean="0"/>
-              <a:t>3/04/2024</a:t>
+              <a:t>7/05/2024</a:t>
             </a:fld>
             <a:endParaRPr lang="es-PE"/>
           </a:p>
@@ -1845,7 +1850,7 @@
           <a:p>
             <a:fld id="{53E513F0-27CE-47BF-98B5-D7A562B895BD}" type="datetimeFigureOut">
               <a:rPr lang="es-PE" smtClean="0"/>
-              <a:t>3/04/2024</a:t>
+              <a:t>7/05/2024</a:t>
             </a:fld>
             <a:endParaRPr lang="es-PE"/>
           </a:p>
@@ -1987,7 +1992,7 @@
           <a:p>
             <a:fld id="{53E513F0-27CE-47BF-98B5-D7A562B895BD}" type="datetimeFigureOut">
               <a:rPr lang="es-PE" smtClean="0"/>
-              <a:t>3/04/2024</a:t>
+              <a:t>7/05/2024</a:t>
             </a:fld>
             <a:endParaRPr lang="es-PE"/>
           </a:p>
@@ -2100,7 +2105,7 @@
           <a:p>
             <a:fld id="{53E513F0-27CE-47BF-98B5-D7A562B895BD}" type="datetimeFigureOut">
               <a:rPr lang="es-PE" smtClean="0"/>
-              <a:t>3/04/2024</a:t>
+              <a:t>7/05/2024</a:t>
             </a:fld>
             <a:endParaRPr lang="es-PE"/>
           </a:p>
@@ -2413,7 +2418,7 @@
           <a:p>
             <a:fld id="{53E513F0-27CE-47BF-98B5-D7A562B895BD}" type="datetimeFigureOut">
               <a:rPr lang="es-PE" smtClean="0"/>
-              <a:t>3/04/2024</a:t>
+              <a:t>7/05/2024</a:t>
             </a:fld>
             <a:endParaRPr lang="es-PE"/>
           </a:p>
@@ -2702,7 +2707,7 @@
           <a:p>
             <a:fld id="{53E513F0-27CE-47BF-98B5-D7A562B895BD}" type="datetimeFigureOut">
               <a:rPr lang="es-PE" smtClean="0"/>
-              <a:t>3/04/2024</a:t>
+              <a:t>7/05/2024</a:t>
             </a:fld>
             <a:endParaRPr lang="es-PE"/>
           </a:p>
@@ -2945,7 +2950,7 @@
           <a:p>
             <a:fld id="{53E513F0-27CE-47BF-98B5-D7A562B895BD}" type="datetimeFigureOut">
               <a:rPr lang="es-PE" smtClean="0"/>
-              <a:t>3/04/2024</a:t>
+              <a:t>7/05/2024</a:t>
             </a:fld>
             <a:endParaRPr lang="es-PE"/>
           </a:p>
@@ -6144,19 +6149,7 @@
               <a:spcAft>
                 <a:spcPct val="0"/>
               </a:spcAft>
-              <a:buFontTx/>
-              <a:buChar char="•"/>
             </a:pPr>
-            <a:r>
-              <a:rPr lang="en-US" sz="2400" dirty="0">
-                <a:solidFill>
-                  <a:srgbClr val="DC143C"/>
-                </a:solidFill>
-                <a:latin typeface="Consolas" pitchFamily="49" charset="0"/>
-                <a:cs typeface="Arial" pitchFamily="34" charset="0"/>
-              </a:rPr>
-              <a:t>complex</a:t>
-            </a:r>
             <a:endParaRPr lang="en-US" sz="2400" dirty="0">
               <a:solidFill>
                 <a:srgbClr val="000000"/>

</xml_diff>